<commit_message>
Adicionado github no ppt
</commit_message>
<xml_diff>
--- a/Docs/Apresentação do Projeto.pptx
+++ b/Docs/Apresentação do Projeto.pptx
@@ -49496,6 +49496,304 @@
               <a:cs typeface="Arial"/>
               <a:sym typeface="Arial"/>
             </a:endParaRPr>
+          </a:p>
+        </p:txBody>
+      </p:sp>
+      <p:sp>
+        <p:nvSpPr>
+          <p:cNvPr id="5" name="Google Shape;189;p28"/>
+          <p:cNvSpPr txBox="1">
+            <a:spLocks/>
+          </p:cNvSpPr>
+          <p:nvPr/>
+        </p:nvSpPr>
+        <p:spPr>
+          <a:xfrm>
+            <a:off x="354012" y="5303520"/>
+            <a:ext cx="7772400" cy="1058091"/>
+          </a:xfrm>
+          <a:prstGeom prst="rect">
+            <a:avLst/>
+          </a:prstGeom>
+          <a:noFill/>
+          <a:ln>
+            <a:noFill/>
+          </a:ln>
+        </p:spPr>
+        <p:txBody>
+          <a:bodyPr spcFirstLastPara="1" wrap="square" lIns="91425" tIns="45700" rIns="91425" bIns="45700" anchor="ctr" anchorCtr="0">
+            <a:noAutofit/>
+          </a:bodyPr>
+          <a:lstStyle>
+            <a:defPPr marR="0" lvl="0" algn="l" rtl="0">
+              <a:lnSpc>
+                <a:spcPct val="100000"/>
+              </a:lnSpc>
+              <a:spcBef>
+                <a:spcPts val="0"/>
+              </a:spcBef>
+              <a:spcAft>
+                <a:spcPts val="0"/>
+              </a:spcAft>
+            </a:defPPr>
+            <a:lvl1pPr marR="0" lvl="0" algn="l" rtl="0">
+              <a:lnSpc>
+                <a:spcPct val="100000"/>
+              </a:lnSpc>
+              <a:spcBef>
+                <a:spcPts val="0"/>
+              </a:spcBef>
+              <a:spcAft>
+                <a:spcPts val="0"/>
+              </a:spcAft>
+              <a:buClr>
+                <a:srgbClr val="000000"/>
+              </a:buClr>
+              <a:buSzPts val="1400"/>
+              <a:buFont typeface="Arial"/>
+              <a:buNone/>
+              <a:defRPr sz="3800" b="0" i="0" u="none" strike="noStrike" cap="none">
+                <a:solidFill>
+                  <a:schemeClr val="lt1"/>
+                </a:solidFill>
+                <a:latin typeface="PT Sans"/>
+                <a:ea typeface="PT Sans"/>
+                <a:cs typeface="PT Sans"/>
+                <a:sym typeface="PT Sans"/>
+              </a:defRPr>
+            </a:lvl1pPr>
+            <a:lvl2pPr marR="0" lvl="1" algn="l" rtl="0">
+              <a:lnSpc>
+                <a:spcPct val="100000"/>
+              </a:lnSpc>
+              <a:spcBef>
+                <a:spcPts val="0"/>
+              </a:spcBef>
+              <a:spcAft>
+                <a:spcPts val="0"/>
+              </a:spcAft>
+              <a:buClr>
+                <a:srgbClr val="000000"/>
+              </a:buClr>
+              <a:buSzPts val="1400"/>
+              <a:buFont typeface="Arial"/>
+              <a:buNone/>
+              <a:defRPr sz="2800" b="0" i="0" u="none" strike="noStrike" cap="none">
+                <a:solidFill>
+                  <a:schemeClr val="lt1"/>
+                </a:solidFill>
+                <a:latin typeface="PT Sans"/>
+                <a:ea typeface="PT Sans"/>
+                <a:cs typeface="PT Sans"/>
+                <a:sym typeface="PT Sans"/>
+              </a:defRPr>
+            </a:lvl2pPr>
+            <a:lvl3pPr marR="0" lvl="2" algn="l" rtl="0">
+              <a:lnSpc>
+                <a:spcPct val="100000"/>
+              </a:lnSpc>
+              <a:spcBef>
+                <a:spcPts val="0"/>
+              </a:spcBef>
+              <a:spcAft>
+                <a:spcPts val="0"/>
+              </a:spcAft>
+              <a:buClr>
+                <a:srgbClr val="000000"/>
+              </a:buClr>
+              <a:buSzPts val="1400"/>
+              <a:buFont typeface="Arial"/>
+              <a:buNone/>
+              <a:defRPr sz="2800" b="0" i="0" u="none" strike="noStrike" cap="none">
+                <a:solidFill>
+                  <a:schemeClr val="lt1"/>
+                </a:solidFill>
+                <a:latin typeface="PT Sans"/>
+                <a:ea typeface="PT Sans"/>
+                <a:cs typeface="PT Sans"/>
+                <a:sym typeface="PT Sans"/>
+              </a:defRPr>
+            </a:lvl3pPr>
+            <a:lvl4pPr marR="0" lvl="3" algn="l" rtl="0">
+              <a:lnSpc>
+                <a:spcPct val="100000"/>
+              </a:lnSpc>
+              <a:spcBef>
+                <a:spcPts val="0"/>
+              </a:spcBef>
+              <a:spcAft>
+                <a:spcPts val="0"/>
+              </a:spcAft>
+              <a:buClr>
+                <a:srgbClr val="000000"/>
+              </a:buClr>
+              <a:buSzPts val="1400"/>
+              <a:buFont typeface="Arial"/>
+              <a:buNone/>
+              <a:defRPr sz="2800" b="0" i="0" u="none" strike="noStrike" cap="none">
+                <a:solidFill>
+                  <a:schemeClr val="lt1"/>
+                </a:solidFill>
+                <a:latin typeface="PT Sans"/>
+                <a:ea typeface="PT Sans"/>
+                <a:cs typeface="PT Sans"/>
+                <a:sym typeface="PT Sans"/>
+              </a:defRPr>
+            </a:lvl4pPr>
+            <a:lvl5pPr marR="0" lvl="4" algn="l" rtl="0">
+              <a:lnSpc>
+                <a:spcPct val="100000"/>
+              </a:lnSpc>
+              <a:spcBef>
+                <a:spcPts val="0"/>
+              </a:spcBef>
+              <a:spcAft>
+                <a:spcPts val="0"/>
+              </a:spcAft>
+              <a:buClr>
+                <a:srgbClr val="000000"/>
+              </a:buClr>
+              <a:buSzPts val="1400"/>
+              <a:buFont typeface="Arial"/>
+              <a:buNone/>
+              <a:defRPr sz="2800" b="0" i="0" u="none" strike="noStrike" cap="none">
+                <a:solidFill>
+                  <a:schemeClr val="lt1"/>
+                </a:solidFill>
+                <a:latin typeface="PT Sans"/>
+                <a:ea typeface="PT Sans"/>
+                <a:cs typeface="PT Sans"/>
+                <a:sym typeface="PT Sans"/>
+              </a:defRPr>
+            </a:lvl5pPr>
+            <a:lvl6pPr marR="0" lvl="5" algn="l" rtl="0">
+              <a:lnSpc>
+                <a:spcPct val="100000"/>
+              </a:lnSpc>
+              <a:spcBef>
+                <a:spcPts val="0"/>
+              </a:spcBef>
+              <a:spcAft>
+                <a:spcPts val="0"/>
+              </a:spcAft>
+              <a:buClr>
+                <a:srgbClr val="000000"/>
+              </a:buClr>
+              <a:buSzPts val="1400"/>
+              <a:buFont typeface="Arial"/>
+              <a:buNone/>
+              <a:defRPr sz="2800" b="0" i="0" u="none" strike="noStrike" cap="none">
+                <a:solidFill>
+                  <a:schemeClr val="lt1"/>
+                </a:solidFill>
+                <a:latin typeface="PT Sans"/>
+                <a:ea typeface="PT Sans"/>
+                <a:cs typeface="PT Sans"/>
+                <a:sym typeface="PT Sans"/>
+              </a:defRPr>
+            </a:lvl6pPr>
+            <a:lvl7pPr marR="0" lvl="6" algn="l" rtl="0">
+              <a:lnSpc>
+                <a:spcPct val="100000"/>
+              </a:lnSpc>
+              <a:spcBef>
+                <a:spcPts val="0"/>
+              </a:spcBef>
+              <a:spcAft>
+                <a:spcPts val="0"/>
+              </a:spcAft>
+              <a:buClr>
+                <a:srgbClr val="000000"/>
+              </a:buClr>
+              <a:buSzPts val="1400"/>
+              <a:buFont typeface="Arial"/>
+              <a:buNone/>
+              <a:defRPr sz="2800" b="0" i="0" u="none" strike="noStrike" cap="none">
+                <a:solidFill>
+                  <a:schemeClr val="lt1"/>
+                </a:solidFill>
+                <a:latin typeface="PT Sans"/>
+                <a:ea typeface="PT Sans"/>
+                <a:cs typeface="PT Sans"/>
+                <a:sym typeface="PT Sans"/>
+              </a:defRPr>
+            </a:lvl7pPr>
+            <a:lvl8pPr marR="0" lvl="7" algn="l" rtl="0">
+              <a:lnSpc>
+                <a:spcPct val="100000"/>
+              </a:lnSpc>
+              <a:spcBef>
+                <a:spcPts val="0"/>
+              </a:spcBef>
+              <a:spcAft>
+                <a:spcPts val="0"/>
+              </a:spcAft>
+              <a:buClr>
+                <a:srgbClr val="000000"/>
+              </a:buClr>
+              <a:buSzPts val="1400"/>
+              <a:buFont typeface="Arial"/>
+              <a:buNone/>
+              <a:defRPr sz="2800" b="0" i="0" u="none" strike="noStrike" cap="none">
+                <a:solidFill>
+                  <a:schemeClr val="lt1"/>
+                </a:solidFill>
+                <a:latin typeface="PT Sans"/>
+                <a:ea typeface="PT Sans"/>
+                <a:cs typeface="PT Sans"/>
+                <a:sym typeface="PT Sans"/>
+              </a:defRPr>
+            </a:lvl8pPr>
+            <a:lvl9pPr marR="0" lvl="8" algn="l" rtl="0">
+              <a:lnSpc>
+                <a:spcPct val="100000"/>
+              </a:lnSpc>
+              <a:spcBef>
+                <a:spcPts val="0"/>
+              </a:spcBef>
+              <a:spcAft>
+                <a:spcPts val="0"/>
+              </a:spcAft>
+              <a:buClr>
+                <a:srgbClr val="000000"/>
+              </a:buClr>
+              <a:buSzPts val="1400"/>
+              <a:buFont typeface="Arial"/>
+              <a:buNone/>
+              <a:defRPr sz="2800" b="0" i="0" u="none" strike="noStrike" cap="none">
+                <a:solidFill>
+                  <a:schemeClr val="lt1"/>
+                </a:solidFill>
+                <a:latin typeface="PT Sans"/>
+                <a:ea typeface="PT Sans"/>
+                <a:cs typeface="PT Sans"/>
+                <a:sym typeface="PT Sans"/>
+              </a:defRPr>
+            </a:lvl9pPr>
+          </a:lstStyle>
+          <a:p>
+            <a:pPr>
+              <a:buClr>
+                <a:schemeClr val="lt1"/>
+              </a:buClr>
+              <a:buSzPts val="3800"/>
+            </a:pPr>
+            <a:r>
+              <a:rPr lang="pt-BR" sz="1800" dirty="0" smtClean="0"/>
+              <a:t>Link do GitHub:</a:t>
+            </a:r>
+            <a:r>
+              <a:rPr lang="pt-BR" dirty="0" smtClean="0"/>
+              <a:t/>
+            </a:r>
+            <a:br>
+              <a:rPr lang="pt-BR" dirty="0" smtClean="0"/>
+            </a:br>
+            <a:r>
+              <a:rPr lang="pt-BR" sz="1600" dirty="0" smtClean="0"/>
+              <a:t>https://github.com/gabriel-de-abreu/Projeto_Banking</a:t>
+            </a:r>
+            <a:endParaRPr lang="pt-BR" sz="1600" dirty="0"/>
           </a:p>
         </p:txBody>
       </p:sp>

</xml_diff>